<commit_message>
subindo poster nao finalizado
</commit_message>
<xml_diff>
--- a/documentacao/pdf/ARQCOMP Exercicio 05 v5 - modelo-poster-template.pptx
+++ b/documentacao/pdf/ARQCOMP Exercicio 05 v5 - modelo-poster-template.pptx
@@ -126,7 +126,7 @@
 <file path=ppt/revisionInfo.xml><?xml version="1.0" encoding="utf-8"?>
 <p1510:revInfo xmlns:a="http://schemas.openxmlformats.org/drawingml/2006/main" xmlns:r="http://schemas.openxmlformats.org/officeDocument/2006/relationships" xmlns:p1510="http://schemas.microsoft.com/office/powerpoint/2015/10/main">
   <p1510:revLst>
-    <p1510:client id="{15857BDA-9570-496D-9F8F-71DAF1D89B42}" v="7" dt="2024-12-04T17:42:34.687"/>
+    <p1510:client id="{87871370-F1F5-4AA8-92A6-F63086D2AE57}" v="2" dt="2024-12-04T18:43:21.669"/>
   </p1510:revLst>
 </p1510:revInfo>
 </file>
@@ -134,336 +134,88 @@
 <file path=ppt/changesInfos/changesInfo1.xml><?xml version="1.0" encoding="utf-8"?>
 <pc:chgInfo xmlns:a="http://schemas.openxmlformats.org/drawingml/2006/main" xmlns:r="http://schemas.openxmlformats.org/officeDocument/2006/relationships" xmlns:ac="http://schemas.microsoft.com/office/drawing/2013/main/command" xmlns:pc="http://schemas.microsoft.com/office/powerpoint/2013/main/command">
   <pc:docChgLst>
-    <pc:chgData name="brito 7802" userId="bb9df5b836737798" providerId="LiveId" clId="{15857BDA-9570-496D-9F8F-71DAF1D89B42}"/>
-    <pc:docChg chg="undo custSel modSld">
-      <pc:chgData name="brito 7802" userId="bb9df5b836737798" providerId="LiveId" clId="{15857BDA-9570-496D-9F8F-71DAF1D89B42}" dt="2024-12-04T17:49:56.442" v="1157" actId="1076"/>
+    <pc:chgData name="brito 7802" userId="bb9df5b836737798" providerId="LiveId" clId="{87871370-F1F5-4AA8-92A6-F63086D2AE57}"/>
+    <pc:docChg chg="custSel modSld">
+      <pc:chgData name="brito 7802" userId="bb9df5b836737798" providerId="LiveId" clId="{87871370-F1F5-4AA8-92A6-F63086D2AE57}" dt="2024-12-04T18:43:44.844" v="32" actId="1076"/>
       <pc:docMkLst>
         <pc:docMk/>
       </pc:docMkLst>
       <pc:sldChg chg="addSp delSp modSp mod">
-        <pc:chgData name="brito 7802" userId="bb9df5b836737798" providerId="LiveId" clId="{15857BDA-9570-496D-9F8F-71DAF1D89B42}" dt="2024-12-04T17:49:56.442" v="1157" actId="1076"/>
+        <pc:chgData name="brito 7802" userId="bb9df5b836737798" providerId="LiveId" clId="{87871370-F1F5-4AA8-92A6-F63086D2AE57}" dt="2024-12-04T18:43:44.844" v="32" actId="1076"/>
         <pc:sldMkLst>
           <pc:docMk/>
           <pc:sldMk cId="0" sldId="256"/>
         </pc:sldMkLst>
-        <pc:spChg chg="add mod">
-          <ac:chgData name="brito 7802" userId="bb9df5b836737798" providerId="LiveId" clId="{15857BDA-9570-496D-9F8F-71DAF1D89B42}" dt="2024-12-04T17:33:53.332" v="901" actId="1076"/>
+        <pc:spChg chg="mod">
+          <ac:chgData name="brito 7802" userId="bb9df5b836737798" providerId="LiveId" clId="{87871370-F1F5-4AA8-92A6-F63086D2AE57}" dt="2024-12-04T17:51:51.319" v="2" actId="1076"/>
           <ac:spMkLst>
             <pc:docMk/>
             <pc:sldMk cId="0" sldId="256"/>
             <ac:spMk id="4" creationId="{88B5A990-449C-B42D-08E6-96D063217549}"/>
           </ac:spMkLst>
         </pc:spChg>
-        <pc:spChg chg="add mod">
-          <ac:chgData name="brito 7802" userId="bb9df5b836737798" providerId="LiveId" clId="{15857BDA-9570-496D-9F8F-71DAF1D89B42}" dt="2024-12-04T17:42:29.549" v="1087" actId="1076"/>
+        <pc:spChg chg="mod">
+          <ac:chgData name="brito 7802" userId="bb9df5b836737798" providerId="LiveId" clId="{87871370-F1F5-4AA8-92A6-F63086D2AE57}" dt="2024-12-04T17:51:42.500" v="0" actId="1076"/>
           <ac:spMkLst>
             <pc:docMk/>
             <pc:sldMk cId="0" sldId="256"/>
             <ac:spMk id="5" creationId="{4C888614-96F0-CEF1-46AA-20AA0E89C0E0}"/>
           </ac:spMkLst>
         </pc:spChg>
-        <pc:spChg chg="add mod">
-          <ac:chgData name="brito 7802" userId="bb9df5b836737798" providerId="LiveId" clId="{15857BDA-9570-496D-9F8F-71DAF1D89B42}" dt="2024-12-04T17:46:47.471" v="1126" actId="255"/>
-          <ac:spMkLst>
-            <pc:docMk/>
-            <pc:sldMk cId="0" sldId="256"/>
-            <ac:spMk id="6" creationId="{578B2768-1F0D-2218-31B8-AAC98DD8F0B8}"/>
-          </ac:spMkLst>
-        </pc:spChg>
         <pc:spChg chg="mod">
-          <ac:chgData name="brito 7802" userId="bb9df5b836737798" providerId="LiveId" clId="{15857BDA-9570-496D-9F8F-71DAF1D89B42}" dt="2024-12-04T17:49:51.260" v="1156" actId="1076"/>
-          <ac:spMkLst>
-            <pc:docMk/>
-            <pc:sldMk cId="0" sldId="256"/>
-            <ac:spMk id="13" creationId="{00000000-0000-0000-0000-000000000000}"/>
-          </ac:spMkLst>
-        </pc:spChg>
-        <pc:spChg chg="mod">
-          <ac:chgData name="brito 7802" userId="bb9df5b836737798" providerId="LiveId" clId="{15857BDA-9570-496D-9F8F-71DAF1D89B42}" dt="2024-12-04T17:49:46.761" v="1155" actId="1076"/>
-          <ac:spMkLst>
-            <pc:docMk/>
-            <pc:sldMk cId="0" sldId="256"/>
-            <ac:spMk id="14" creationId="{00000000-0000-0000-0000-000000000000}"/>
-          </ac:spMkLst>
-        </pc:spChg>
-        <pc:spChg chg="mod">
-          <ac:chgData name="brito 7802" userId="bb9df5b836737798" providerId="LiveId" clId="{15857BDA-9570-496D-9F8F-71DAF1D89B42}" dt="2024-12-04T17:49:56.442" v="1157" actId="1076"/>
-          <ac:spMkLst>
-            <pc:docMk/>
-            <pc:sldMk cId="0" sldId="256"/>
-            <ac:spMk id="16" creationId="{00000000-0000-0000-0000-000000000000}"/>
-          </ac:spMkLst>
-        </pc:spChg>
-        <pc:spChg chg="mod">
-          <ac:chgData name="brito 7802" userId="bb9df5b836737798" providerId="LiveId" clId="{15857BDA-9570-496D-9F8F-71DAF1D89B42}" dt="2024-12-04T17:48:39.493" v="1140" actId="20577"/>
-          <ac:spMkLst>
-            <pc:docMk/>
-            <pc:sldMk cId="0" sldId="256"/>
-            <ac:spMk id="24" creationId="{00000000-0000-0000-0000-000000000000}"/>
-          </ac:spMkLst>
-        </pc:spChg>
-        <pc:spChg chg="mod">
-          <ac:chgData name="brito 7802" userId="bb9df5b836737798" providerId="LiveId" clId="{15857BDA-9570-496D-9F8F-71DAF1D89B42}" dt="2024-12-04T17:49:27.782" v="1152" actId="1076"/>
-          <ac:spMkLst>
-            <pc:docMk/>
-            <pc:sldMk cId="0" sldId="256"/>
-            <ac:spMk id="27" creationId="{3C7C4711-7675-D2D5-5E4B-06431EBD3A09}"/>
-          </ac:spMkLst>
-        </pc:spChg>
-        <pc:spChg chg="mod">
-          <ac:chgData name="brito 7802" userId="bb9df5b836737798" providerId="LiveId" clId="{15857BDA-9570-496D-9F8F-71DAF1D89B42}" dt="2024-12-04T17:48:20.456" v="1131" actId="1076"/>
-          <ac:spMkLst>
-            <pc:docMk/>
-            <pc:sldMk cId="0" sldId="256"/>
-            <ac:spMk id="28" creationId="{00000000-0000-0000-0000-000000000000}"/>
-          </ac:spMkLst>
-        </pc:spChg>
-        <pc:spChg chg="mod">
-          <ac:chgData name="brito 7802" userId="bb9df5b836737798" providerId="LiveId" clId="{15857BDA-9570-496D-9F8F-71DAF1D89B42}" dt="2024-12-04T17:33:58.677" v="902" actId="1076"/>
+          <ac:chgData name="brito 7802" userId="bb9df5b836737798" providerId="LiveId" clId="{87871370-F1F5-4AA8-92A6-F63086D2AE57}" dt="2024-12-04T17:51:55.608" v="3" actId="1076"/>
           <ac:spMkLst>
             <pc:docMk/>
             <pc:sldMk cId="0" sldId="256"/>
             <ac:spMk id="38" creationId="{00000000-0000-0000-0000-000000000000}"/>
           </ac:spMkLst>
         </pc:spChg>
-        <pc:spChg chg="del">
-          <ac:chgData name="brito 7802" userId="bb9df5b836737798" providerId="LiveId" clId="{15857BDA-9570-496D-9F8F-71DAF1D89B42}" dt="2024-12-04T17:23:26.694" v="53" actId="478"/>
-          <ac:spMkLst>
-            <pc:docMk/>
-            <pc:sldMk cId="0" sldId="256"/>
-            <ac:spMk id="39" creationId="{00000000-0000-0000-0000-000000000000}"/>
-          </ac:spMkLst>
-        </pc:spChg>
-        <pc:spChg chg="del">
-          <ac:chgData name="brito 7802" userId="bb9df5b836737798" providerId="LiveId" clId="{15857BDA-9570-496D-9F8F-71DAF1D89B42}" dt="2024-12-04T17:23:28.247" v="54" actId="478"/>
-          <ac:spMkLst>
-            <pc:docMk/>
-            <pc:sldMk cId="0" sldId="256"/>
-            <ac:spMk id="40" creationId="{00000000-0000-0000-0000-000000000000}"/>
-          </ac:spMkLst>
-        </pc:spChg>
-        <pc:spChg chg="del">
-          <ac:chgData name="brito 7802" userId="bb9df5b836737798" providerId="LiveId" clId="{15857BDA-9570-496D-9F8F-71DAF1D89B42}" dt="2024-12-04T17:23:29.752" v="55" actId="478"/>
-          <ac:spMkLst>
-            <pc:docMk/>
-            <pc:sldMk cId="0" sldId="256"/>
-            <ac:spMk id="41" creationId="{00000000-0000-0000-0000-000000000000}"/>
-          </ac:spMkLst>
-        </pc:spChg>
-        <pc:spChg chg="del">
-          <ac:chgData name="brito 7802" userId="bb9df5b836737798" providerId="LiveId" clId="{15857BDA-9570-496D-9F8F-71DAF1D89B42}" dt="2024-12-04T17:23:32.011" v="56" actId="478"/>
-          <ac:spMkLst>
-            <pc:docMk/>
-            <pc:sldMk cId="0" sldId="256"/>
-            <ac:spMk id="42" creationId="{00000000-0000-0000-0000-000000000000}"/>
-          </ac:spMkLst>
-        </pc:spChg>
-        <pc:spChg chg="del">
-          <ac:chgData name="brito 7802" userId="bb9df5b836737798" providerId="LiveId" clId="{15857BDA-9570-496D-9F8F-71DAF1D89B42}" dt="2024-12-04T17:24:07.368" v="64" actId="478"/>
-          <ac:spMkLst>
-            <pc:docMk/>
-            <pc:sldMk cId="0" sldId="256"/>
-            <ac:spMk id="43" creationId="{00000000-0000-0000-0000-000000000000}"/>
-          </ac:spMkLst>
-        </pc:spChg>
         <pc:spChg chg="mod">
-          <ac:chgData name="brito 7802" userId="bb9df5b836737798" providerId="LiveId" clId="{15857BDA-9570-496D-9F8F-71DAF1D89B42}" dt="2024-12-04T17:33:30.126" v="898" actId="1076"/>
+          <ac:chgData name="brito 7802" userId="bb9df5b836737798" providerId="LiveId" clId="{87871370-F1F5-4AA8-92A6-F63086D2AE57}" dt="2024-12-04T18:39:41.319" v="18" actId="20577"/>
           <ac:spMkLst>
             <pc:docMk/>
             <pc:sldMk cId="0" sldId="256"/>
             <ac:spMk id="44" creationId="{00000000-0000-0000-0000-000000000000}"/>
           </ac:spMkLst>
         </pc:spChg>
-        <pc:spChg chg="del">
-          <ac:chgData name="brito 7802" userId="bb9df5b836737798" providerId="LiveId" clId="{15857BDA-9570-496D-9F8F-71DAF1D89B42}" dt="2024-12-04T17:24:26.338" v="71" actId="478"/>
-          <ac:spMkLst>
-            <pc:docMk/>
-            <pc:sldMk cId="0" sldId="256"/>
-            <ac:spMk id="45" creationId="{00000000-0000-0000-0000-000000000000}"/>
-          </ac:spMkLst>
-        </pc:spChg>
-        <pc:spChg chg="del">
-          <ac:chgData name="brito 7802" userId="bb9df5b836737798" providerId="LiveId" clId="{15857BDA-9570-496D-9F8F-71DAF1D89B42}" dt="2024-12-04T17:24:24.656" v="70" actId="478"/>
-          <ac:spMkLst>
-            <pc:docMk/>
-            <pc:sldMk cId="0" sldId="256"/>
-            <ac:spMk id="46" creationId="{00000000-0000-0000-0000-000000000000}"/>
-          </ac:spMkLst>
-        </pc:spChg>
-        <pc:spChg chg="del">
-          <ac:chgData name="brito 7802" userId="bb9df5b836737798" providerId="LiveId" clId="{15857BDA-9570-496D-9F8F-71DAF1D89B42}" dt="2024-12-04T17:24:22.918" v="69" actId="478"/>
-          <ac:spMkLst>
-            <pc:docMk/>
-            <pc:sldMk cId="0" sldId="256"/>
-            <ac:spMk id="47" creationId="{00000000-0000-0000-0000-000000000000}"/>
-          </ac:spMkLst>
-        </pc:spChg>
-        <pc:spChg chg="del">
-          <ac:chgData name="brito 7802" userId="bb9df5b836737798" providerId="LiveId" clId="{15857BDA-9570-496D-9F8F-71DAF1D89B42}" dt="2024-12-04T17:24:21.614" v="68" actId="478"/>
-          <ac:spMkLst>
-            <pc:docMk/>
-            <pc:sldMk cId="0" sldId="256"/>
-            <ac:spMk id="48" creationId="{00000000-0000-0000-0000-000000000000}"/>
-          </ac:spMkLst>
-        </pc:spChg>
-        <pc:spChg chg="del">
-          <ac:chgData name="brito 7802" userId="bb9df5b836737798" providerId="LiveId" clId="{15857BDA-9570-496D-9F8F-71DAF1D89B42}" dt="2024-12-04T17:24:18.978" v="67" actId="478"/>
-          <ac:spMkLst>
-            <pc:docMk/>
-            <pc:sldMk cId="0" sldId="256"/>
-            <ac:spMk id="49" creationId="{00000000-0000-0000-0000-000000000000}"/>
-          </ac:spMkLst>
-        </pc:spChg>
-        <pc:spChg chg="del">
-          <ac:chgData name="brito 7802" userId="bb9df5b836737798" providerId="LiveId" clId="{15857BDA-9570-496D-9F8F-71DAF1D89B42}" dt="2024-12-04T17:24:17.613" v="66" actId="478"/>
-          <ac:spMkLst>
-            <pc:docMk/>
-            <pc:sldMk cId="0" sldId="256"/>
-            <ac:spMk id="50" creationId="{00000000-0000-0000-0000-000000000000}"/>
-          </ac:spMkLst>
-        </pc:spChg>
-        <pc:spChg chg="del">
-          <ac:chgData name="brito 7802" userId="bb9df5b836737798" providerId="LiveId" clId="{15857BDA-9570-496D-9F8F-71DAF1D89B42}" dt="2024-12-04T17:20:45.808" v="41" actId="478"/>
-          <ac:spMkLst>
-            <pc:docMk/>
-            <pc:sldMk cId="0" sldId="256"/>
-            <ac:spMk id="51" creationId="{00000000-0000-0000-0000-000000000000}"/>
-          </ac:spMkLst>
-        </pc:spChg>
-        <pc:spChg chg="add del">
-          <ac:chgData name="brito 7802" userId="bb9df5b836737798" providerId="LiveId" clId="{15857BDA-9570-496D-9F8F-71DAF1D89B42}" dt="2024-12-04T17:32:51.213" v="891" actId="478"/>
-          <ac:spMkLst>
-            <pc:docMk/>
-            <pc:sldMk cId="0" sldId="256"/>
-            <ac:spMk id="52" creationId="{00000000-0000-0000-0000-000000000000}"/>
-          </ac:spMkLst>
-        </pc:spChg>
-        <pc:spChg chg="add del">
-          <ac:chgData name="brito 7802" userId="bb9df5b836737798" providerId="LiveId" clId="{15857BDA-9570-496D-9F8F-71DAF1D89B42}" dt="2024-12-04T17:32:52.876" v="892" actId="478"/>
-          <ac:spMkLst>
-            <pc:docMk/>
-            <pc:sldMk cId="0" sldId="256"/>
-            <ac:spMk id="53" creationId="{00000000-0000-0000-0000-000000000000}"/>
-          </ac:spMkLst>
-        </pc:spChg>
-        <pc:spChg chg="add del">
-          <ac:chgData name="brito 7802" userId="bb9df5b836737798" providerId="LiveId" clId="{15857BDA-9570-496D-9F8F-71DAF1D89B42}" dt="2024-12-04T17:32:54.095" v="893" actId="478"/>
-          <ac:spMkLst>
-            <pc:docMk/>
-            <pc:sldMk cId="0" sldId="256"/>
-            <ac:spMk id="54" creationId="{00000000-0000-0000-0000-000000000000}"/>
-          </ac:spMkLst>
-        </pc:spChg>
-        <pc:spChg chg="add del">
-          <ac:chgData name="brito 7802" userId="bb9df5b836737798" providerId="LiveId" clId="{15857BDA-9570-496D-9F8F-71DAF1D89B42}" dt="2024-12-04T17:32:55.247" v="894" actId="478"/>
-          <ac:spMkLst>
-            <pc:docMk/>
-            <pc:sldMk cId="0" sldId="256"/>
-            <ac:spMk id="55" creationId="{00000000-0000-0000-0000-000000000000}"/>
-          </ac:spMkLst>
-        </pc:spChg>
-        <pc:spChg chg="add del mod">
-          <ac:chgData name="brito 7802" userId="bb9df5b836737798" providerId="LiveId" clId="{15857BDA-9570-496D-9F8F-71DAF1D89B42}" dt="2024-12-04T17:35:37.739" v="908" actId="478"/>
-          <ac:spMkLst>
-            <pc:docMk/>
-            <pc:sldMk cId="0" sldId="256"/>
-            <ac:spMk id="56" creationId="{00000000-0000-0000-0000-000000000000}"/>
-          </ac:spMkLst>
-        </pc:spChg>
-        <pc:spChg chg="del">
-          <ac:chgData name="brito 7802" userId="bb9df5b836737798" providerId="LiveId" clId="{15857BDA-9570-496D-9F8F-71DAF1D89B42}" dt="2024-12-04T17:35:45.116" v="910" actId="478"/>
-          <ac:spMkLst>
-            <pc:docMk/>
-            <pc:sldMk cId="0" sldId="256"/>
-            <ac:spMk id="57" creationId="{00000000-0000-0000-0000-000000000000}"/>
-          </ac:spMkLst>
-        </pc:spChg>
-        <pc:spChg chg="del mod">
-          <ac:chgData name="brito 7802" userId="bb9df5b836737798" providerId="LiveId" clId="{15857BDA-9570-496D-9F8F-71DAF1D89B42}" dt="2024-12-04T17:35:42.982" v="909" actId="478"/>
-          <ac:spMkLst>
-            <pc:docMk/>
-            <pc:sldMk cId="0" sldId="256"/>
-            <ac:spMk id="58" creationId="{00000000-0000-0000-0000-000000000000}"/>
-          </ac:spMkLst>
-        </pc:spChg>
-        <pc:spChg chg="del mod">
-          <ac:chgData name="brito 7802" userId="bb9df5b836737798" providerId="LiveId" clId="{15857BDA-9570-496D-9F8F-71DAF1D89B42}" dt="2024-12-04T17:21:59.561" v="46" actId="478"/>
-          <ac:spMkLst>
-            <pc:docMk/>
-            <pc:sldMk cId="0" sldId="256"/>
-            <ac:spMk id="59" creationId="{00000000-0000-0000-0000-000000000000}"/>
-          </ac:spMkLst>
-        </pc:spChg>
         <pc:spChg chg="mod">
-          <ac:chgData name="brito 7802" userId="bb9df5b836737798" providerId="LiveId" clId="{15857BDA-9570-496D-9F8F-71DAF1D89B42}" dt="2024-12-04T17:48:14.197" v="1130" actId="1076"/>
+          <ac:chgData name="brito 7802" userId="bb9df5b836737798" providerId="LiveId" clId="{87871370-F1F5-4AA8-92A6-F63086D2AE57}" dt="2024-12-04T18:39:23.475" v="15" actId="1076"/>
           <ac:spMkLst>
             <pc:docMk/>
             <pc:sldMk cId="0" sldId="256"/>
             <ac:spMk id="62" creationId="{00000000-0000-0000-0000-000000000000}"/>
           </ac:spMkLst>
         </pc:spChg>
-        <pc:spChg chg="mod">
-          <ac:chgData name="brito 7802" userId="bb9df5b836737798" providerId="LiveId" clId="{15857BDA-9570-496D-9F8F-71DAF1D89B42}" dt="2024-12-04T17:48:07.105" v="1128" actId="1076"/>
-          <ac:spMkLst>
-            <pc:docMk/>
-            <pc:sldMk cId="0" sldId="256"/>
-            <ac:spMk id="63" creationId="{00000000-0000-0000-0000-000000000000}"/>
-          </ac:spMkLst>
-        </pc:spChg>
-        <pc:spChg chg="mod">
-          <ac:chgData name="brito 7802" userId="bb9df5b836737798" providerId="LiveId" clId="{15857BDA-9570-496D-9F8F-71DAF1D89B42}" dt="2024-12-04T17:34:12.545" v="905" actId="1076"/>
-          <ac:spMkLst>
-            <pc:docMk/>
-            <pc:sldMk cId="0" sldId="256"/>
-            <ac:spMk id="69" creationId="{00000000-0000-0000-0000-000000000000}"/>
-          </ac:spMkLst>
-        </pc:spChg>
-        <pc:spChg chg="mod">
-          <ac:chgData name="brito 7802" userId="bb9df5b836737798" providerId="LiveId" clId="{15857BDA-9570-496D-9F8F-71DAF1D89B42}" dt="2024-12-04T17:48:10.151" v="1129" actId="1076"/>
+        <pc:spChg chg="del">
+          <ac:chgData name="brito 7802" userId="bb9df5b836737798" providerId="LiveId" clId="{87871370-F1F5-4AA8-92A6-F63086D2AE57}" dt="2024-12-04T18:38:26.131" v="4" actId="478"/>
           <ac:spMkLst>
             <pc:docMk/>
             <pc:sldMk cId="0" sldId="256"/>
             <ac:spMk id="76" creationId="{172E3FE7-2523-B268-5445-FC1DD1798D77}"/>
           </ac:spMkLst>
         </pc:spChg>
-        <pc:spChg chg="mod">
-          <ac:chgData name="brito 7802" userId="bb9df5b836737798" providerId="LiveId" clId="{15857BDA-9570-496D-9F8F-71DAF1D89B42}" dt="2024-12-04T17:48:26.397" v="1132" actId="1076"/>
-          <ac:spMkLst>
-            <pc:docMk/>
-            <pc:sldMk cId="0" sldId="256"/>
-            <ac:spMk id="77" creationId="{F06DF230-9610-AA81-A854-D06B95D3412D}"/>
-          </ac:spMkLst>
-        </pc:spChg>
-        <pc:picChg chg="del mod">
-          <ac:chgData name="brito 7802" userId="bb9df5b836737798" providerId="LiveId" clId="{15857BDA-9570-496D-9F8F-71DAF1D89B42}" dt="2024-12-04T17:16:23.242" v="1" actId="478"/>
+        <pc:picChg chg="add del mod">
+          <ac:chgData name="brito 7802" userId="bb9df5b836737798" providerId="LiveId" clId="{87871370-F1F5-4AA8-92A6-F63086D2AE57}" dt="2024-12-04T18:42:03.857" v="19" actId="478"/>
           <ac:picMkLst>
             <pc:docMk/>
             <pc:sldMk cId="0" sldId="256"/>
-            <ac:picMk id="66" creationId="{00000000-0000-0000-0000-000000000000}"/>
+            <ac:picMk id="8" creationId="{3F69FBB4-49CB-9C88-AD4C-3E3ACED76989}"/>
           </ac:picMkLst>
         </pc:picChg>
         <pc:picChg chg="add del mod">
-          <ac:chgData name="brito 7802" userId="bb9df5b836737798" providerId="LiveId" clId="{15857BDA-9570-496D-9F8F-71DAF1D89B42}" dt="2024-12-04T17:32:18.384" v="851" actId="478"/>
+          <ac:chgData name="brito 7802" userId="bb9df5b836737798" providerId="LiveId" clId="{87871370-F1F5-4AA8-92A6-F63086D2AE57}" dt="2024-12-04T18:42:21.199" v="24" actId="478"/>
           <ac:picMkLst>
             <pc:docMk/>
             <pc:sldMk cId="0" sldId="256"/>
-            <ac:picMk id="73" creationId="{6C5A89EA-7045-490A-B1BC-F6CE280C3F1B}"/>
+            <ac:picMk id="10" creationId="{CD158B0A-B98A-8F57-C507-723B38C28C20}"/>
           </ac:picMkLst>
         </pc:picChg>
-        <pc:picChg chg="mod">
-          <ac:chgData name="brito 7802" userId="bb9df5b836737798" providerId="LiveId" clId="{15857BDA-9570-496D-9F8F-71DAF1D89B42}" dt="2024-12-04T17:48:01.394" v="1127" actId="1076"/>
+        <pc:picChg chg="add mod">
+          <ac:chgData name="brito 7802" userId="bb9df5b836737798" providerId="LiveId" clId="{87871370-F1F5-4AA8-92A6-F63086D2AE57}" dt="2024-12-04T18:43:44.844" v="32" actId="1076"/>
           <ac:picMkLst>
             <pc:docMk/>
             <pc:sldMk cId="0" sldId="256"/>
-            <ac:picMk id="79" creationId="{78811F03-55CA-D8D1-3426-32B112B999A3}"/>
-          </ac:picMkLst>
-        </pc:picChg>
-        <pc:picChg chg="mod">
-          <ac:chgData name="brito 7802" userId="bb9df5b836737798" providerId="LiveId" clId="{15857BDA-9570-496D-9F8F-71DAF1D89B42}" dt="2024-12-04T17:34:16.413" v="906" actId="1076"/>
-          <ac:picMkLst>
-            <pc:docMk/>
-            <pc:sldMk cId="0" sldId="256"/>
-            <ac:picMk id="81" creationId="{4E8061DA-134D-9308-83E0-CDFFCF6B73A4}"/>
+            <ac:picMk id="12" creationId="{D01282EC-7BE1-8C07-291F-11DDE996583B}"/>
           </ac:picMkLst>
         </pc:picChg>
       </pc:sldChg>
@@ -3491,7 +3243,7 @@
         </p:nvSpPr>
         <p:spPr>
           <a:xfrm>
-            <a:off x="10016495" y="6517302"/>
+            <a:off x="10016495" y="6613111"/>
             <a:ext cx="4440755" cy="281487"/>
           </a:xfrm>
           <a:prstGeom prst="rect">
@@ -3534,7 +3286,7 @@
         </p:nvSpPr>
         <p:spPr>
           <a:xfrm>
-            <a:off x="10016496" y="10471306"/>
+            <a:off x="10016495" y="10559591"/>
             <a:ext cx="4034154" cy="281487"/>
           </a:xfrm>
           <a:prstGeom prst="rect">
@@ -3570,11 +3322,18 @@
               <a:t> </a:t>
             </a:r>
             <a:r>
+              <a:rPr lang="pt-BR" sz="1750" b="1" spc="-5" dirty="0">
+                <a:latin typeface="Arial"/>
+                <a:cs typeface="Arial"/>
+              </a:rPr>
+              <a:t>B</a:t>
+            </a:r>
+            <a:r>
               <a:rPr sz="1750" b="1" spc="-5" dirty="0" err="1">
                 <a:latin typeface="Arial"/>
                 <a:cs typeface="Arial"/>
               </a:rPr>
-              <a:t>bibliográficas</a:t>
+              <a:t>ibliográficas</a:t>
             </a:r>
             <a:endParaRPr sz="1750" dirty="0">
               <a:latin typeface="Arial"/>
@@ -3591,7 +3350,7 @@
         </p:nvSpPr>
         <p:spPr>
           <a:xfrm>
-            <a:off x="6584189" y="9305427"/>
+            <a:off x="6584187" y="9524621"/>
             <a:ext cx="1762125" cy="256993"/>
           </a:xfrm>
           <a:prstGeom prst="rect">
@@ -5090,67 +4849,6 @@
       </p:sp>
       <p:sp>
         <p:nvSpPr>
-          <p:cNvPr id="76" name="Freeform 12">
-            <a:extLst>
-              <a:ext uri="{FF2B5EF4-FFF2-40B4-BE49-F238E27FC236}">
-                <a16:creationId xmlns:a16="http://schemas.microsoft.com/office/drawing/2014/main" id="{172E3FE7-2523-B268-5445-FC1DD1798D77}"/>
-              </a:ext>
-            </a:extLst>
-          </p:cNvPr>
-          <p:cNvSpPr>
-            <a:spLocks noChangeAspect="1"/>
-          </p:cNvSpPr>
-          <p:nvPr/>
-        </p:nvSpPr>
-        <p:spPr>
-          <a:xfrm>
-            <a:off x="5507991" y="6513780"/>
-            <a:ext cx="3863046" cy="2607556"/>
-          </a:xfrm>
-          <a:custGeom>
-            <a:avLst/>
-            <a:gdLst/>
-            <a:ahLst/>
-            <a:cxnLst/>
-            <a:rect l="l" t="t" r="r" b="b"/>
-            <a:pathLst>
-              <a:path w="12351542" h="8337291">
-                <a:moveTo>
-                  <a:pt x="0" y="0"/>
-                </a:moveTo>
-                <a:lnTo>
-                  <a:pt x="12351543" y="0"/>
-                </a:lnTo>
-                <a:lnTo>
-                  <a:pt x="12351543" y="8337292"/>
-                </a:lnTo>
-                <a:lnTo>
-                  <a:pt x="0" y="8337292"/>
-                </a:lnTo>
-                <a:lnTo>
-                  <a:pt x="0" y="0"/>
-                </a:lnTo>
-                <a:close/>
-              </a:path>
-            </a:pathLst>
-          </a:custGeom>
-          <a:blipFill>
-            <a:blip r:embed="rId3"/>
-            <a:stretch>
-              <a:fillRect/>
-            </a:stretch>
-          </a:blipFill>
-        </p:spPr>
-        <p:txBody>
-          <a:bodyPr/>
-          <a:lstStyle/>
-          <a:p>
-            <a:endParaRPr lang="pt-BR"/>
-          </a:p>
-        </p:txBody>
-      </p:sp>
-      <p:sp>
-        <p:nvSpPr>
           <p:cNvPr id="77" name="object 14">
             <a:extLst>
               <a:ext uri="{FF2B5EF4-FFF2-40B4-BE49-F238E27FC236}">
@@ -5254,7 +4952,7 @@
           <p:nvPr/>
         </p:nvPicPr>
         <p:blipFill>
-          <a:blip r:embed="rId4" cstate="print">
+          <a:blip r:embed="rId3" cstate="print">
             <a:extLst>
               <a:ext uri="{28A0092B-C50C-407E-A947-70E740481C1C}">
                 <a14:useLocalDpi xmlns:a14="http://schemas.microsoft.com/office/drawing/2010/main" val="0"/>
@@ -5290,7 +4988,7 @@
           <p:nvPr/>
         </p:nvPicPr>
         <p:blipFill>
-          <a:blip r:embed="rId5"/>
+          <a:blip r:embed="rId4"/>
           <a:stretch>
             <a:fillRect/>
           </a:stretch>
@@ -5319,7 +5017,7 @@
         </p:nvSpPr>
         <p:spPr>
           <a:xfrm>
-            <a:off x="10019484" y="6875099"/>
+            <a:off x="10019484" y="6961046"/>
             <a:ext cx="4454705" cy="2974532"/>
           </a:xfrm>
           <a:prstGeom prst="rect">
@@ -5409,7 +5107,7 @@
         </p:nvSpPr>
         <p:spPr>
           <a:xfrm>
-            <a:off x="10019484" y="10836455"/>
+            <a:off x="10019484" y="10960298"/>
             <a:ext cx="4454705" cy="2718052"/>
           </a:xfrm>
           <a:prstGeom prst="rect">
@@ -5727,6 +5425,42 @@
           </a:p>
         </p:txBody>
       </p:sp>
+      <p:pic>
+        <p:nvPicPr>
+          <p:cNvPr id="12" name="Imagem 11" descr="Interface gráfica do usuário&#10;&#10;Descrição gerada automaticamente">
+            <a:extLst>
+              <a:ext uri="{FF2B5EF4-FFF2-40B4-BE49-F238E27FC236}">
+                <a16:creationId xmlns:a16="http://schemas.microsoft.com/office/drawing/2014/main" id="{D01282EC-7BE1-8C07-291F-11DDE996583B}"/>
+              </a:ext>
+            </a:extLst>
+          </p:cNvPr>
+          <p:cNvPicPr>
+            <a:picLocks noChangeAspect="1"/>
+          </p:cNvPicPr>
+          <p:nvPr/>
+        </p:nvPicPr>
+        <p:blipFill>
+          <a:blip r:embed="rId5">
+            <a:extLst>
+              <a:ext uri="{28A0092B-C50C-407E-A947-70E740481C1C}">
+                <a14:useLocalDpi xmlns:a14="http://schemas.microsoft.com/office/drawing/2010/main" val="0"/>
+              </a:ext>
+            </a:extLst>
+          </a:blip>
+          <a:stretch>
+            <a:fillRect/>
+          </a:stretch>
+        </p:blipFill>
+        <p:spPr>
+          <a:xfrm>
+            <a:off x="5864281" y="6448414"/>
+            <a:ext cx="3210536" cy="2974533"/>
+          </a:xfrm>
+          <a:prstGeom prst="rect">
+            <a:avLst/>
+          </a:prstGeom>
+        </p:spPr>
+      </p:pic>
     </p:spTree>
   </p:cSld>
   <p:clrMapOvr>
@@ -6019,6 +5753,23 @@
 </file>
 
 <file path=customXml/item1.xml><?xml version="1.0" encoding="utf-8"?>
+<p:properties xmlns:p="http://schemas.microsoft.com/office/2006/metadata/properties" xmlns:xsi="http://www.w3.org/2001/XMLSchema-instance" xmlns:pc="http://schemas.microsoft.com/office/infopath/2007/PartnerControls">
+  <documentManagement>
+    <_activity xmlns="9fdc8751-6fef-42ec-b05c-835dd8c535b4" xsi:nil="true"/>
+  </documentManagement>
+</p:properties>
+</file>
+
+<file path=customXml/item2.xml><?xml version="1.0" encoding="utf-8"?>
+<?mso-contentType ?>
+<FormTemplates xmlns="http://schemas.microsoft.com/sharepoint/v3/contenttype/forms">
+  <Display>DocumentLibraryForm</Display>
+  <Edit>DocumentLibraryForm</Edit>
+  <New>DocumentLibraryForm</New>
+</FormTemplates>
+</file>
+
+<file path=customXml/item3.xml><?xml version="1.0" encoding="utf-8"?>
 <ct:contentTypeSchema xmlns:ct="http://schemas.microsoft.com/office/2006/metadata/contentType" xmlns:ma="http://schemas.microsoft.com/office/2006/metadata/properties/metaAttributes" ct:_="" ma:_="" ma:contentTypeName="Document" ma:contentTypeID="0x010100FD11765F9AC0004AAF0A4CAAFDFAF16A" ma:contentTypeVersion="10" ma:contentTypeDescription="Create a new document." ma:contentTypeScope="" ma:versionID="f68d4f1da2573cf71374ea1c6e3a1b83">
   <xsd:schema xmlns:xsd="http://www.w3.org/2001/XMLSchema" xmlns:xs="http://www.w3.org/2001/XMLSchema" xmlns:p="http://schemas.microsoft.com/office/2006/metadata/properties" xmlns:ns3="9fdc8751-6fef-42ec-b05c-835dd8c535b4" targetNamespace="http://schemas.microsoft.com/office/2006/metadata/properties" ma:root="true" ma:fieldsID="ba9603622386bd6dbdc32adceef51156" ns3:_="">
     <xsd:import namespace="9fdc8751-6fef-42ec-b05c-835dd8c535b4"/>
@@ -6200,24 +5951,31 @@
 </ct:contentTypeSchema>
 </file>
 
-<file path=customXml/item2.xml><?xml version="1.0" encoding="utf-8"?>
-<?mso-contentType ?>
-<FormTemplates xmlns="http://schemas.microsoft.com/sharepoint/v3/contenttype/forms">
-  <Display>DocumentLibraryForm</Display>
-  <Edit>DocumentLibraryForm</Edit>
-  <New>DocumentLibraryForm</New>
-</FormTemplates>
+<file path=customXml/itemProps1.xml><?xml version="1.0" encoding="utf-8"?>
+<ds:datastoreItem xmlns:ds="http://schemas.openxmlformats.org/officeDocument/2006/customXml" ds:itemID="{B8805DBE-11A9-44B2-B1C9-8464BDD7F455}">
+  <ds:schemaRefs>
+    <ds:schemaRef ds:uri="9fdc8751-6fef-42ec-b05c-835dd8c535b4"/>
+    <ds:schemaRef ds:uri="http://purl.org/dc/terms/"/>
+    <ds:schemaRef ds:uri="http://schemas.microsoft.com/office/2006/documentManagement/types"/>
+    <ds:schemaRef ds:uri="http://purl.org/dc/elements/1.1/"/>
+    <ds:schemaRef ds:uri="http://purl.org/dc/dcmitype/"/>
+    <ds:schemaRef ds:uri="http://schemas.microsoft.com/office/2006/metadata/properties"/>
+    <ds:schemaRef ds:uri="http://schemas.microsoft.com/office/infopath/2007/PartnerControls"/>
+    <ds:schemaRef ds:uri="http://schemas.openxmlformats.org/package/2006/metadata/core-properties"/>
+    <ds:schemaRef ds:uri="http://www.w3.org/XML/1998/namespace"/>
+  </ds:schemaRefs>
+</ds:datastoreItem>
 </file>
 
-<file path=customXml/item3.xml><?xml version="1.0" encoding="utf-8"?>
-<p:properties xmlns:p="http://schemas.microsoft.com/office/2006/metadata/properties" xmlns:xsi="http://www.w3.org/2001/XMLSchema-instance" xmlns:pc="http://schemas.microsoft.com/office/infopath/2007/PartnerControls">
-  <documentManagement>
-    <_activity xmlns="9fdc8751-6fef-42ec-b05c-835dd8c535b4" xsi:nil="true"/>
-  </documentManagement>
-</p:properties>
+<file path=customXml/itemProps2.xml><?xml version="1.0" encoding="utf-8"?>
+<ds:datastoreItem xmlns:ds="http://schemas.openxmlformats.org/officeDocument/2006/customXml" ds:itemID="{C03AB621-7547-4540-908C-3B5F70969FC9}">
+  <ds:schemaRefs>
+    <ds:schemaRef ds:uri="http://schemas.microsoft.com/sharepoint/v3/contenttype/forms"/>
+  </ds:schemaRefs>
+</ds:datastoreItem>
 </file>
 
-<file path=customXml/itemProps1.xml><?xml version="1.0" encoding="utf-8"?>
+<file path=customXml/itemProps3.xml><?xml version="1.0" encoding="utf-8"?>
 <ds:datastoreItem xmlns:ds="http://schemas.openxmlformats.org/officeDocument/2006/customXml" ds:itemID="{D1A29903-5CB4-475D-AC9A-5C4AAA239945}">
   <ds:schemaRefs>
     <ds:schemaRef ds:uri="http://schemas.microsoft.com/office/2006/metadata/contentType"/>
@@ -6233,28 +5991,4 @@
     <ds:schemaRef ds:uri="http://schemas.microsoft.com/internal/obd"/>
   </ds:schemaRefs>
 </ds:datastoreItem>
-</file>
-
-<file path=customXml/itemProps2.xml><?xml version="1.0" encoding="utf-8"?>
-<ds:datastoreItem xmlns:ds="http://schemas.openxmlformats.org/officeDocument/2006/customXml" ds:itemID="{C03AB621-7547-4540-908C-3B5F70969FC9}">
-  <ds:schemaRefs>
-    <ds:schemaRef ds:uri="http://schemas.microsoft.com/sharepoint/v3/contenttype/forms"/>
-  </ds:schemaRefs>
-</ds:datastoreItem>
-</file>
-
-<file path=customXml/itemProps3.xml><?xml version="1.0" encoding="utf-8"?>
-<ds:datastoreItem xmlns:ds="http://schemas.openxmlformats.org/officeDocument/2006/customXml" ds:itemID="{B8805DBE-11A9-44B2-B1C9-8464BDD7F455}">
-  <ds:schemaRefs>
-    <ds:schemaRef ds:uri="9fdc8751-6fef-42ec-b05c-835dd8c535b4"/>
-    <ds:schemaRef ds:uri="http://purl.org/dc/terms/"/>
-    <ds:schemaRef ds:uri="http://schemas.microsoft.com/office/2006/documentManagement/types"/>
-    <ds:schemaRef ds:uri="http://purl.org/dc/elements/1.1/"/>
-    <ds:schemaRef ds:uri="http://purl.org/dc/dcmitype/"/>
-    <ds:schemaRef ds:uri="http://schemas.microsoft.com/office/2006/metadata/properties"/>
-    <ds:schemaRef ds:uri="http://schemas.microsoft.com/office/infopath/2007/PartnerControls"/>
-    <ds:schemaRef ds:uri="http://schemas.openxmlformats.org/package/2006/metadata/core-properties"/>
-    <ds:schemaRef ds:uri="http://www.w3.org/XML/1998/namespace"/>
-  </ds:schemaRefs>
-</ds:datastoreItem>
 </file>
</xml_diff>